<commit_message>
doc upgrade, project finished
</commit_message>
<xml_diff>
--- a/Doc/Relazione.pptx
+++ b/Doc/Relazione.pptx
@@ -9,7 +9,10 @@
     <p:sldId id="259" r:id="rId3"/>
     <p:sldId id="260" r:id="rId4"/>
     <p:sldId id="258" r:id="rId5"/>
-    <p:sldId id="257" r:id="rId6"/>
+    <p:sldId id="263" r:id="rId6"/>
+    <p:sldId id="261" r:id="rId7"/>
+    <p:sldId id="264" r:id="rId8"/>
+    <p:sldId id="257" r:id="rId9"/>
   </p:sldIdLst>
   <p:sldSz cx="9144000" cy="6858000" type="screen4x3"/>
   <p:notesSz cx="6858000" cy="9144000"/>
@@ -496,7 +499,7 @@
             <a:fld id="{4B6055F8-1D02-4417-9241-55C834FD9970}" type="datetimeFigureOut">
               <a:rPr lang="it-IT" smtClean="0"/>
               <a:pPr/>
-              <a:t>22/11/2019</a:t>
+              <a:t>25/11/2019</a:t>
             </a:fld>
             <a:endParaRPr lang="it-IT"/>
           </a:p>
@@ -539,7 +542,7 @@
             <a:fld id="{B007B441-5312-499D-93C3-6E37886527FA}" type="slidenum">
               <a:rPr lang="it-IT" smtClean="0"/>
               <a:pPr/>
-              <a:t>‹#›</a:t>
+              <a:t>‹N›</a:t>
             </a:fld>
             <a:endParaRPr lang="it-IT"/>
           </a:p>
@@ -663,7 +666,7 @@
             <a:fld id="{4B6055F8-1D02-4417-9241-55C834FD9970}" type="datetimeFigureOut">
               <a:rPr lang="it-IT" smtClean="0"/>
               <a:pPr/>
-              <a:t>22/11/2019</a:t>
+              <a:t>25/11/2019</a:t>
             </a:fld>
             <a:endParaRPr lang="it-IT"/>
           </a:p>
@@ -706,7 +709,7 @@
             <a:fld id="{B007B441-5312-499D-93C3-6E37886527FA}" type="slidenum">
               <a:rPr lang="it-IT" smtClean="0"/>
               <a:pPr/>
-              <a:t>‹#›</a:t>
+              <a:t>‹N›</a:t>
             </a:fld>
             <a:endParaRPr lang="it-IT"/>
           </a:p>
@@ -840,7 +843,7 @@
             <a:fld id="{4B6055F8-1D02-4417-9241-55C834FD9970}" type="datetimeFigureOut">
               <a:rPr lang="it-IT" smtClean="0"/>
               <a:pPr/>
-              <a:t>22/11/2019</a:t>
+              <a:t>25/11/2019</a:t>
             </a:fld>
             <a:endParaRPr lang="it-IT"/>
           </a:p>
@@ -883,7 +886,7 @@
             <a:fld id="{B007B441-5312-499D-93C3-6E37886527FA}" type="slidenum">
               <a:rPr lang="it-IT" smtClean="0"/>
               <a:pPr/>
-              <a:t>‹#›</a:t>
+              <a:t>‹N›</a:t>
             </a:fld>
             <a:endParaRPr lang="it-IT"/>
           </a:p>
@@ -1011,7 +1014,7 @@
             <a:fld id="{4B6055F8-1D02-4417-9241-55C834FD9970}" type="datetimeFigureOut">
               <a:rPr lang="it-IT" smtClean="0"/>
               <a:pPr/>
-              <a:t>22/11/2019</a:t>
+              <a:t>25/11/2019</a:t>
             </a:fld>
             <a:endParaRPr lang="it-IT"/>
           </a:p>
@@ -1054,7 +1057,7 @@
             <a:fld id="{B007B441-5312-499D-93C3-6E37886527FA}" type="slidenum">
               <a:rPr lang="it-IT" smtClean="0"/>
               <a:pPr/>
-              <a:t>‹#›</a:t>
+              <a:t>‹N›</a:t>
             </a:fld>
             <a:endParaRPr lang="it-IT"/>
           </a:p>
@@ -1468,7 +1471,7 @@
             <a:fld id="{4B6055F8-1D02-4417-9241-55C834FD9970}" type="datetimeFigureOut">
               <a:rPr lang="it-IT" smtClean="0"/>
               <a:pPr/>
-              <a:t>22/11/2019</a:t>
+              <a:t>25/11/2019</a:t>
             </a:fld>
             <a:endParaRPr lang="it-IT"/>
           </a:p>
@@ -1511,7 +1514,7 @@
             <a:fld id="{B007B441-5312-499D-93C3-6E37886527FA}" type="slidenum">
               <a:rPr lang="it-IT" smtClean="0"/>
               <a:pPr/>
-              <a:t>‹#›</a:t>
+              <a:t>‹N›</a:t>
             </a:fld>
             <a:endParaRPr lang="it-IT"/>
           </a:p>
@@ -1734,7 +1737,7 @@
             <a:fld id="{4B6055F8-1D02-4417-9241-55C834FD9970}" type="datetimeFigureOut">
               <a:rPr lang="it-IT" smtClean="0"/>
               <a:pPr/>
-              <a:t>22/11/2019</a:t>
+              <a:t>25/11/2019</a:t>
             </a:fld>
             <a:endParaRPr lang="it-IT"/>
           </a:p>
@@ -1777,7 +1780,7 @@
             <a:fld id="{B007B441-5312-499D-93C3-6E37886527FA}" type="slidenum">
               <a:rPr lang="it-IT" smtClean="0"/>
               <a:pPr/>
-              <a:t>‹#›</a:t>
+              <a:t>‹N›</a:t>
             </a:fld>
             <a:endParaRPr lang="it-IT"/>
           </a:p>
@@ -2110,7 +2113,7 @@
             <a:fld id="{4B6055F8-1D02-4417-9241-55C834FD9970}" type="datetimeFigureOut">
               <a:rPr lang="it-IT" smtClean="0"/>
               <a:pPr/>
-              <a:t>22/11/2019</a:t>
+              <a:t>25/11/2019</a:t>
             </a:fld>
             <a:endParaRPr lang="it-IT"/>
           </a:p>
@@ -2153,7 +2156,7 @@
             <a:fld id="{B007B441-5312-499D-93C3-6E37886527FA}" type="slidenum">
               <a:rPr lang="it-IT" smtClean="0"/>
               <a:pPr/>
-              <a:t>‹#›</a:t>
+              <a:t>‹N›</a:t>
             </a:fld>
             <a:endParaRPr lang="it-IT"/>
           </a:p>
@@ -2234,7 +2237,7 @@
             <a:fld id="{4B6055F8-1D02-4417-9241-55C834FD9970}" type="datetimeFigureOut">
               <a:rPr lang="it-IT" smtClean="0"/>
               <a:pPr/>
-              <a:t>22/11/2019</a:t>
+              <a:t>25/11/2019</a:t>
             </a:fld>
             <a:endParaRPr lang="it-IT"/>
           </a:p>
@@ -2258,7 +2261,7 @@
             <a:fld id="{B007B441-5312-499D-93C3-6E37886527FA}" type="slidenum">
               <a:rPr lang="it-IT" smtClean="0"/>
               <a:pPr/>
-              <a:t>‹#›</a:t>
+              <a:t>‹N›</a:t>
             </a:fld>
             <a:endParaRPr lang="it-IT"/>
           </a:p>
@@ -2326,7 +2329,7 @@
             <a:fld id="{4B6055F8-1D02-4417-9241-55C834FD9970}" type="datetimeFigureOut">
               <a:rPr lang="it-IT" smtClean="0"/>
               <a:pPr/>
-              <a:t>22/11/2019</a:t>
+              <a:t>25/11/2019</a:t>
             </a:fld>
             <a:endParaRPr lang="it-IT"/>
           </a:p>
@@ -2369,7 +2372,7 @@
             <a:fld id="{B007B441-5312-499D-93C3-6E37886527FA}" type="slidenum">
               <a:rPr lang="it-IT" smtClean="0"/>
               <a:pPr/>
-              <a:t>‹#›</a:t>
+              <a:t>‹N›</a:t>
             </a:fld>
             <a:endParaRPr lang="it-IT"/>
           </a:p>
@@ -2577,7 +2580,7 @@
             <a:fld id="{4B6055F8-1D02-4417-9241-55C834FD9970}" type="datetimeFigureOut">
               <a:rPr lang="it-IT" smtClean="0"/>
               <a:pPr/>
-              <a:t>22/11/2019</a:t>
+              <a:t>25/11/2019</a:t>
             </a:fld>
             <a:endParaRPr lang="it-IT"/>
           </a:p>
@@ -2625,7 +2628,7 @@
             <a:fld id="{B007B441-5312-499D-93C3-6E37886527FA}" type="slidenum">
               <a:rPr lang="it-IT" smtClean="0"/>
               <a:pPr/>
-              <a:t>‹#›</a:t>
+              <a:t>‹N›</a:t>
             </a:fld>
             <a:endParaRPr lang="it-IT"/>
           </a:p>
@@ -2838,7 +2841,7 @@
             <a:fld id="{4B6055F8-1D02-4417-9241-55C834FD9970}" type="datetimeFigureOut">
               <a:rPr lang="it-IT" smtClean="0"/>
               <a:pPr/>
-              <a:t>22/11/2019</a:t>
+              <a:t>25/11/2019</a:t>
             </a:fld>
             <a:endParaRPr lang="it-IT"/>
           </a:p>
@@ -2881,7 +2884,7 @@
             <a:fld id="{B007B441-5312-499D-93C3-6E37886527FA}" type="slidenum">
               <a:rPr lang="it-IT" smtClean="0"/>
               <a:pPr/>
-              <a:t>‹#›</a:t>
+              <a:t>‹N›</a:t>
             </a:fld>
             <a:endParaRPr lang="it-IT"/>
           </a:p>
@@ -3244,7 +3247,7 @@
             <a:fld id="{4B6055F8-1D02-4417-9241-55C834FD9970}" type="datetimeFigureOut">
               <a:rPr lang="it-IT" smtClean="0"/>
               <a:pPr/>
-              <a:t>22/11/2019</a:t>
+              <a:t>25/11/2019</a:t>
             </a:fld>
             <a:endParaRPr lang="it-IT"/>
           </a:p>
@@ -3323,7 +3326,7 @@
             <a:fld id="{B007B441-5312-499D-93C3-6E37886527FA}" type="slidenum">
               <a:rPr lang="it-IT" smtClean="0"/>
               <a:pPr/>
-              <a:t>‹#›</a:t>
+              <a:t>‹N›</a:t>
             </a:fld>
             <a:endParaRPr lang="it-IT"/>
           </a:p>
@@ -3875,24 +3878,22 @@
           <a:p>
             <a:r>
               <a:rPr lang="it-IT" sz="1200" dirty="0" smtClean="0"/>
-              <a:t>ATTIVITÀ </a:t>
-            </a:r>
-            <a:r>
-              <a:rPr lang="it-IT" sz="1200" dirty="0" smtClean="0"/>
-              <a:t>PROGETTUALE DI FONDAMENTI DI INTELLIGENZA ARTIFICIALE </a:t>
-            </a:r>
-            <a:r>
-              <a:rPr lang="it-IT" sz="1200" dirty="0" smtClean="0"/>
-              <a:t>M</a:t>
-            </a:r>
-            <a:endParaRPr lang="it-IT" sz="1200" dirty="0" smtClean="0"/>
+              <a:t>ATTIVITÀ PROGETTUALE DI FONDAMENTI DI INTELLIGENZA ARTIFICIALE M</a:t>
+            </a:r>
           </a:p>
           <a:p>
             <a:r>
               <a:rPr lang="it-IT" sz="1000" dirty="0" smtClean="0"/>
-              <a:t>(Docente) Prof. Paola Mello</a:t>
-            </a:r>
-            <a:endParaRPr lang="it-IT" sz="1000" dirty="0" smtClean="0"/>
+              <a:t>(</a:t>
+            </a:r>
+            <a:r>
+              <a:rPr lang="it-IT" sz="1000" dirty="0" smtClean="0"/>
+              <a:t>Docente) </a:t>
+            </a:r>
+            <a:r>
+              <a:rPr lang="it-IT" sz="1000" dirty="0" smtClean="0"/>
+              <a:t>Prof. Paola Mello</a:t>
+            </a:r>
           </a:p>
           <a:p>
             <a:r>
@@ -4024,6 +4025,13 @@
   <p:clrMapOvr>
     <a:masterClrMapping/>
   </p:clrMapOvr>
+  <p:timing>
+    <p:tnLst>
+      <p:par>
+        <p:cTn id="1" dur="indefinite" restart="never" nodeType="tmRoot"/>
+      </p:par>
+    </p:tnLst>
+  </p:timing>
 </p:sld>
 </file>
 
@@ -4109,6 +4117,13 @@
   <p:clrMapOvr>
     <a:masterClrMapping/>
   </p:clrMapOvr>
+  <p:timing>
+    <p:tnLst>
+      <p:par>
+        <p:cTn id="1" dur="indefinite" restart="never" nodeType="tmRoot"/>
+      </p:par>
+    </p:tnLst>
+  </p:timing>
 </p:sld>
 </file>
 
@@ -4148,11 +4163,7 @@
           <a:p>
             <a:r>
               <a:rPr lang="it-IT" dirty="0" smtClean="0"/>
-              <a:t>Survey </a:t>
-            </a:r>
-            <a:r>
-              <a:rPr lang="it-IT" dirty="0" smtClean="0"/>
-              <a:t>engine – sprints</a:t>
+              <a:t>Survey engine – sprints</a:t>
             </a:r>
             <a:endParaRPr lang="it-IT" dirty="0"/>
           </a:p>
@@ -4160,7 +4171,7 @@
       </p:sp>
       <p:pic>
         <p:nvPicPr>
-          <p:cNvPr id="4" name="Picture 2" descr="C:\Users\TSG\Downloads\Untitled Diagram (1).png"/>
+          <p:cNvPr id="1027" name="Picture 3" descr="C:\MyData\CompilationHelper\Doc\SprintsV2.png"/>
           <p:cNvPicPr>
             <a:picLocks noChangeAspect="1" noChangeArrowheads="1"/>
           </p:cNvPicPr>
@@ -4175,8 +4186,8 @@
         </p:blipFill>
         <p:spPr bwMode="auto">
           <a:xfrm>
-            <a:off x="988020" y="1412776"/>
-            <a:ext cx="6464300" cy="4356100"/>
+            <a:off x="467544" y="1253719"/>
+            <a:ext cx="7992888" cy="5386170"/>
           </a:xfrm>
           <a:prstGeom prst="rect">
             <a:avLst/>
@@ -4189,6 +4200,13 @@
   <p:clrMapOvr>
     <a:masterClrMapping/>
   </p:clrMapOvr>
+  <p:timing>
+    <p:tnLst>
+      <p:par>
+        <p:cTn id="1" dur="indefinite" restart="never" nodeType="tmRoot"/>
+      </p:par>
+    </p:tnLst>
+  </p:timing>
 </p:sld>
 </file>
 
@@ -4226,11 +4244,273 @@
           <a:p>
             <a:r>
               <a:rPr lang="it-IT" dirty="0" smtClean="0"/>
-              <a:t>Survey </a:t>
-            </a:r>
+              <a:t>Survey engine - prolog</a:t>
+            </a:r>
+            <a:endParaRPr lang="it-IT" dirty="0"/>
+          </a:p>
+        </p:txBody>
+      </p:sp>
+      <p:sp>
+        <p:nvSpPr>
+          <p:cNvPr id="3" name="Rettangolo 2"/>
+          <p:cNvSpPr/>
+          <p:nvPr/>
+        </p:nvSpPr>
+        <p:spPr>
+          <a:xfrm>
+            <a:off x="251520" y="1556792"/>
+            <a:ext cx="7920880" cy="369332"/>
+          </a:xfrm>
+          <a:prstGeom prst="rect">
+            <a:avLst/>
+          </a:prstGeom>
+        </p:spPr>
+        <p:txBody>
+          <a:bodyPr wrap="square">
+            <a:spAutoFit/>
+          </a:bodyPr>
+          <a:lstStyle/>
+          <a:p>
             <a:r>
               <a:rPr lang="it-IT" dirty="0" smtClean="0"/>
-              <a:t>engine - prolog</a:t>
+              <a:t>Struttura dati delle domande dei questionari in </a:t>
+            </a:r>
+            <a:r>
+              <a:rPr lang="it-IT" dirty="0" err="1" smtClean="0"/>
+              <a:t>prolog</a:t>
+            </a:r>
+            <a:endParaRPr lang="it-IT" dirty="0"/>
+          </a:p>
+        </p:txBody>
+      </p:sp>
+      <p:sp>
+        <p:nvSpPr>
+          <p:cNvPr id="5" name="Rettangolo 4"/>
+          <p:cNvSpPr/>
+          <p:nvPr/>
+        </p:nvSpPr>
+        <p:spPr>
+          <a:xfrm>
+            <a:off x="611560" y="1916832"/>
+            <a:ext cx="7776864" cy="461665"/>
+          </a:xfrm>
+          <a:prstGeom prst="rect">
+            <a:avLst/>
+          </a:prstGeom>
+        </p:spPr>
+        <p:txBody>
+          <a:bodyPr wrap="square">
+            <a:spAutoFit/>
+          </a:bodyPr>
+          <a:lstStyle/>
+          <a:p>
+            <a:r>
+              <a:rPr lang="it-IT" sz="2400" dirty="0" err="1" smtClean="0"/>
+              <a:t>answer</a:t>
+            </a:r>
+            <a:r>
+              <a:rPr lang="it-IT" sz="2400" dirty="0" smtClean="0"/>
+              <a:t>(</a:t>
+            </a:r>
+            <a:r>
+              <a:rPr lang="it-IT" sz="2400" dirty="0" smtClean="0">
+                <a:solidFill>
+                  <a:schemeClr val="accent1">
+                    <a:lumMod val="60000"/>
+                    <a:lumOff val="40000"/>
+                  </a:schemeClr>
+                </a:solidFill>
+              </a:rPr>
+              <a:t>ID</a:t>
+            </a:r>
+            <a:r>
+              <a:rPr lang="it-IT" sz="2400" dirty="0" smtClean="0"/>
+              <a:t>,Testo,</a:t>
+            </a:r>
+            <a:r>
+              <a:rPr lang="it-IT" sz="2400" dirty="0" smtClean="0">
+                <a:solidFill>
+                  <a:schemeClr val="accent6">
+                    <a:lumMod val="75000"/>
+                  </a:schemeClr>
+                </a:solidFill>
+              </a:rPr>
+              <a:t>Risposta</a:t>
+            </a:r>
+            <a:r>
+              <a:rPr lang="it-IT" sz="2400" dirty="0" smtClean="0"/>
+              <a:t>,</a:t>
+            </a:r>
+            <a:r>
+              <a:rPr lang="it-IT" sz="2400" dirty="0" err="1" smtClean="0">
+                <a:solidFill>
+                  <a:schemeClr val="accent1">
+                    <a:lumMod val="60000"/>
+                    <a:lumOff val="40000"/>
+                  </a:schemeClr>
+                </a:solidFill>
+              </a:rPr>
+              <a:t>ID_Next</a:t>
+            </a:r>
+            <a:r>
+              <a:rPr lang="it-IT" sz="2400" dirty="0" smtClean="0"/>
+              <a:t>):-</a:t>
+            </a:r>
+            <a:r>
+              <a:rPr lang="it-IT" sz="2400" dirty="0" smtClean="0">
+                <a:solidFill>
+                  <a:schemeClr val="bg2">
+                    <a:lumMod val="40000"/>
+                    <a:lumOff val="60000"/>
+                  </a:schemeClr>
+                </a:solidFill>
+              </a:rPr>
+              <a:t>Comportamento</a:t>
+            </a:r>
+            <a:endParaRPr lang="it-IT" sz="2400" dirty="0">
+              <a:solidFill>
+                <a:schemeClr val="bg2">
+                  <a:lumMod val="40000"/>
+                  <a:lumOff val="60000"/>
+                </a:schemeClr>
+              </a:solidFill>
+            </a:endParaRPr>
+          </a:p>
+        </p:txBody>
+      </p:sp>
+      <p:sp>
+        <p:nvSpPr>
+          <p:cNvPr id="6" name="Rettangolo 5"/>
+          <p:cNvSpPr/>
+          <p:nvPr/>
+        </p:nvSpPr>
+        <p:spPr>
+          <a:xfrm>
+            <a:off x="395536" y="2708920"/>
+            <a:ext cx="7920880" cy="3139321"/>
+          </a:xfrm>
+          <a:prstGeom prst="rect">
+            <a:avLst/>
+          </a:prstGeom>
+        </p:spPr>
+        <p:txBody>
+          <a:bodyPr wrap="square">
+            <a:spAutoFit/>
+          </a:bodyPr>
+          <a:lstStyle/>
+          <a:p>
+            <a:pPr>
+              <a:buFont typeface="Arial" pitchFamily="34" charset="0"/>
+              <a:buChar char="•"/>
+            </a:pPr>
+            <a:r>
+              <a:rPr lang="it-IT" dirty="0" smtClean="0">
+                <a:solidFill>
+                  <a:schemeClr val="accent1">
+                    <a:lumMod val="60000"/>
+                    <a:lumOff val="40000"/>
+                  </a:schemeClr>
+                </a:solidFill>
+              </a:rPr>
+              <a:t>ID</a:t>
+            </a:r>
+            <a:r>
+              <a:rPr lang="it-IT" dirty="0" smtClean="0"/>
+              <a:t> e </a:t>
+            </a:r>
+            <a:r>
+              <a:rPr lang="it-IT" dirty="0" err="1" smtClean="0">
+                <a:solidFill>
+                  <a:schemeClr val="accent1">
+                    <a:lumMod val="60000"/>
+                    <a:lumOff val="40000"/>
+                  </a:schemeClr>
+                </a:solidFill>
+              </a:rPr>
+              <a:t>ID_Next</a:t>
+            </a:r>
+            <a:r>
+              <a:rPr lang="it-IT" dirty="0" smtClean="0"/>
+              <a:t> sono rispettivamente l’identificatore della domanda corrente e 	l’identificatore della domanda successiva in base alla risposta 	</a:t>
+            </a:r>
+            <a:r>
+              <a:rPr lang="it-IT" dirty="0" err="1" smtClean="0">
+                <a:solidFill>
+                  <a:schemeClr val="accent6">
+                    <a:lumMod val="75000"/>
+                  </a:schemeClr>
+                </a:solidFill>
+              </a:rPr>
+              <a:t>Risposta</a:t>
+            </a:r>
+            <a:r>
+              <a:rPr lang="it-IT" dirty="0" smtClean="0"/>
+              <a:t>.</a:t>
+            </a:r>
+          </a:p>
+          <a:p>
+            <a:endParaRPr lang="it-IT" dirty="0" smtClean="0"/>
+          </a:p>
+          <a:p>
+            <a:pPr>
+              <a:buFont typeface="Arial" pitchFamily="34" charset="0"/>
+              <a:buChar char="•"/>
+            </a:pPr>
+            <a:r>
+              <a:rPr lang="it-IT" dirty="0" smtClean="0">
+                <a:solidFill>
+                  <a:schemeClr val="accent6">
+                    <a:lumMod val="75000"/>
+                  </a:schemeClr>
+                </a:solidFill>
+              </a:rPr>
+              <a:t>Risposta</a:t>
+            </a:r>
+            <a:r>
+              <a:rPr lang="it-IT" dirty="0" smtClean="0"/>
+              <a:t> è la risposta dell’utente, può essere un atomo, una variabile o un 	numero.</a:t>
+            </a:r>
+          </a:p>
+          <a:p>
+            <a:endParaRPr lang="it-IT" dirty="0" smtClean="0"/>
+          </a:p>
+          <a:p>
+            <a:pPr>
+              <a:buFont typeface="Arial" pitchFamily="34" charset="0"/>
+              <a:buChar char="•"/>
+            </a:pPr>
+            <a:r>
+              <a:rPr lang="it-IT" dirty="0" smtClean="0"/>
+              <a:t>Testo è il testo della domanda.</a:t>
+            </a:r>
+          </a:p>
+          <a:p>
+            <a:endParaRPr lang="it-IT" dirty="0" smtClean="0"/>
+          </a:p>
+          <a:p>
+            <a:pPr>
+              <a:buFont typeface="Arial" pitchFamily="34" charset="0"/>
+              <a:buChar char="•"/>
+            </a:pPr>
+            <a:r>
+              <a:rPr lang="it-IT" dirty="0" smtClean="0">
+                <a:solidFill>
+                  <a:schemeClr val="accent3"/>
+                </a:solidFill>
+              </a:rPr>
+              <a:t>Comportamento </a:t>
+            </a:r>
+            <a:r>
+              <a:rPr lang="it-IT" dirty="0" smtClean="0"/>
+              <a:t>consiste nell’eventuale codice </a:t>
+            </a:r>
+            <a:r>
+              <a:rPr lang="it-IT" dirty="0" err="1" smtClean="0"/>
+              <a:t>prolog</a:t>
+            </a:r>
+            <a:r>
+              <a:rPr lang="it-IT" dirty="0" smtClean="0"/>
+              <a:t> che può essere 	eseguito all’invocazione della regola</a:t>
             </a:r>
             <a:endParaRPr lang="it-IT" dirty="0"/>
           </a:p>
@@ -4241,6 +4521,13 @@
   <p:clrMapOvr>
     <a:masterClrMapping/>
   </p:clrMapOvr>
+  <p:timing>
+    <p:tnLst>
+      <p:par>
+        <p:cTn id="1" dur="indefinite" restart="never" nodeType="tmRoot"/>
+      </p:par>
+    </p:tnLst>
+  </p:timing>
 </p:sld>
 </file>
 
@@ -4263,7 +4550,7 @@
       </p:grpSpPr>
       <p:sp>
         <p:nvSpPr>
-          <p:cNvPr id="2" name="Title 1"/>
+          <p:cNvPr id="16" name="Title 15"/>
           <p:cNvSpPr>
             <a:spLocks noGrp="1"/>
           </p:cNvSpPr>
@@ -4278,7 +4565,7 @@
           <a:p>
             <a:r>
               <a:rPr lang="it-IT" dirty="0" smtClean="0"/>
-              <a:t>Repository di rifrimento:</a:t>
+              <a:t>Survey engine - prolog</a:t>
             </a:r>
             <a:endParaRPr lang="it-IT" dirty="0"/>
           </a:p>
@@ -4286,65 +4573,867 @@
       </p:sp>
       <p:sp>
         <p:nvSpPr>
-          <p:cNvPr id="3" name="Content Placeholder 2"/>
-          <p:cNvSpPr>
-            <a:spLocks noGrp="1"/>
-          </p:cNvSpPr>
-          <p:nvPr>
-            <p:ph idx="1"/>
-          </p:nvPr>
-        </p:nvSpPr>
-        <p:spPr/>
-        <p:txBody>
-          <a:bodyPr/>
-          <a:lstStyle/>
-          <a:p>
-            <a:r>
-              <a:rPr lang="it-IT" sz="2400" dirty="0" smtClean="0"/>
-              <a:t>Progetto</a:t>
-            </a:r>
-          </a:p>
-          <a:p>
-            <a:pPr lvl="1"/>
-            <a:r>
-              <a:rPr lang="it-IT" sz="2000" dirty="0" smtClean="0"/>
-              <a:t>https://github.com/FerrariAndrea/CompilationHelper.git</a:t>
-            </a:r>
-          </a:p>
-          <a:p>
-            <a:r>
-              <a:rPr lang="it-IT" sz="2400" dirty="0" smtClean="0"/>
-              <a:t>Interfaccia prolog-node</a:t>
-            </a:r>
-          </a:p>
-          <a:p>
-            <a:pPr lvl="1"/>
-            <a:r>
-              <a:rPr lang="it-IT" sz="2000" dirty="0" smtClean="0"/>
-              <a:t>https://github.com/rla/node-swipl.git</a:t>
-            </a:r>
-          </a:p>
-          <a:p>
-            <a:r>
-              <a:rPr lang="it-IT" sz="2400" dirty="0" smtClean="0"/>
-              <a:t>Generatore di grafici in javascript</a:t>
-            </a:r>
-          </a:p>
-          <a:p>
-            <a:pPr lvl="1"/>
-            <a:r>
-              <a:rPr lang="it-IT" sz="2000" dirty="0" smtClean="0"/>
-              <a:t>https</a:t>
-            </a:r>
-            <a:r>
-              <a:rPr lang="it-IT" sz="2000" dirty="0" smtClean="0"/>
-              <a:t>://</a:t>
-            </a:r>
-            <a:r>
-              <a:rPr lang="it-IT" sz="2000" dirty="0" smtClean="0"/>
-              <a:t>github.com/jacomyal/sigma.js.git</a:t>
-            </a:r>
-            <a:endParaRPr lang="it-IT" sz="2000" dirty="0" smtClean="0"/>
+          <p:cNvPr id="3" name="Rettangolo 2"/>
+          <p:cNvSpPr/>
+          <p:nvPr/>
+        </p:nvSpPr>
+        <p:spPr>
+          <a:xfrm>
+            <a:off x="539552" y="1196752"/>
+            <a:ext cx="7920880" cy="5262979"/>
+          </a:xfrm>
+          <a:prstGeom prst="rect">
+            <a:avLst/>
+          </a:prstGeom>
+        </p:spPr>
+        <p:txBody>
+          <a:bodyPr wrap="square">
+            <a:spAutoFit/>
+          </a:bodyPr>
+          <a:lstStyle/>
+          <a:p>
+            <a:r>
+              <a:rPr lang="it-IT" sz="1600" dirty="0" smtClean="0"/>
+              <a:t>Per ogni sessione di utente (utilizzando i “moduli” </a:t>
+            </a:r>
+            <a:r>
+              <a:rPr lang="it-IT" sz="1600" dirty="0" err="1" smtClean="0"/>
+              <a:t>prolog</a:t>
+            </a:r>
+            <a:r>
+              <a:rPr lang="it-IT" sz="1600" dirty="0" smtClean="0"/>
+              <a:t> per differenziare le sessioni) abbiamo a disposizione le seguenti regole:</a:t>
+            </a:r>
+          </a:p>
+          <a:p>
+            <a:pPr>
+              <a:buFont typeface="Arial" pitchFamily="34" charset="0"/>
+              <a:buChar char="•"/>
+            </a:pPr>
+            <a:r>
+              <a:rPr lang="it-IT" sz="1600" dirty="0" err="1" smtClean="0"/>
+              <a:t>nextAnswer</a:t>
+            </a:r>
+            <a:r>
+              <a:rPr lang="it-IT" sz="1600" dirty="0" smtClean="0"/>
+              <a:t>(</a:t>
+            </a:r>
+            <a:r>
+              <a:rPr lang="it-IT" sz="1600" dirty="0" smtClean="0">
+                <a:solidFill>
+                  <a:schemeClr val="bg1">
+                    <a:lumMod val="95000"/>
+                    <a:lumOff val="5000"/>
+                  </a:schemeClr>
+                </a:solidFill>
+              </a:rPr>
+              <a:t>1</a:t>
+            </a:r>
+            <a:r>
+              <a:rPr lang="it-IT" sz="1600" dirty="0" smtClean="0"/>
+              <a:t>)</a:t>
+            </a:r>
+          </a:p>
+          <a:p>
+            <a:pPr lvl="1">
+              <a:buFont typeface="Arial" pitchFamily="34" charset="0"/>
+              <a:buChar char="•"/>
+            </a:pPr>
+            <a:r>
+              <a:rPr lang="it-IT" sz="1600" dirty="0" smtClean="0"/>
+              <a:t>Il contatore che tiene traccia dell’</a:t>
+            </a:r>
+            <a:r>
+              <a:rPr lang="it-IT" sz="1600" dirty="0" smtClean="0">
+                <a:solidFill>
+                  <a:schemeClr val="bg1">
+                    <a:lumMod val="95000"/>
+                    <a:lumOff val="5000"/>
+                  </a:schemeClr>
+                </a:solidFill>
+              </a:rPr>
+              <a:t>ID</a:t>
+            </a:r>
+            <a:r>
+              <a:rPr lang="it-IT" sz="1600" dirty="0" smtClean="0"/>
+              <a:t> della domanda corrente</a:t>
+            </a:r>
+          </a:p>
+          <a:p>
+            <a:pPr>
+              <a:buFont typeface="Arial" pitchFamily="34" charset="0"/>
+              <a:buChar char="•"/>
+            </a:pPr>
+            <a:r>
+              <a:rPr lang="it-IT" sz="1600" dirty="0" err="1" smtClean="0"/>
+              <a:t>changeAnswere</a:t>
+            </a:r>
+            <a:r>
+              <a:rPr lang="it-IT" sz="1600" dirty="0" smtClean="0"/>
+              <a:t>(</a:t>
+            </a:r>
+            <a:r>
+              <a:rPr lang="it-IT" sz="1600" dirty="0" smtClean="0">
+                <a:solidFill>
+                  <a:schemeClr val="bg1"/>
+                </a:solidFill>
+              </a:rPr>
+              <a:t>X</a:t>
+            </a:r>
+            <a:r>
+              <a:rPr lang="it-IT" sz="1600" dirty="0" smtClean="0"/>
+              <a:t>):-(</a:t>
+            </a:r>
+            <a:r>
+              <a:rPr lang="it-IT" sz="1600" dirty="0" err="1" smtClean="0"/>
+              <a:t>retract</a:t>
+            </a:r>
+            <a:r>
+              <a:rPr lang="it-IT" sz="1600" dirty="0" smtClean="0"/>
+              <a:t>(</a:t>
+            </a:r>
+            <a:r>
+              <a:rPr lang="it-IT" sz="1600" dirty="0" err="1" smtClean="0"/>
+              <a:t>nextAnswer</a:t>
+            </a:r>
+            <a:r>
+              <a:rPr lang="it-IT" sz="1600" dirty="0" smtClean="0"/>
+              <a:t>(_)),</a:t>
+            </a:r>
+            <a:r>
+              <a:rPr lang="it-IT" sz="1600" dirty="0" err="1" smtClean="0"/>
+              <a:t>assert</a:t>
+            </a:r>
+            <a:r>
+              <a:rPr lang="it-IT" sz="1600" dirty="0" smtClean="0"/>
+              <a:t>(</a:t>
+            </a:r>
+            <a:r>
+              <a:rPr lang="it-IT" sz="1600" dirty="0" err="1" smtClean="0"/>
+              <a:t>nextAnswer</a:t>
+            </a:r>
+            <a:r>
+              <a:rPr lang="it-IT" sz="1600" dirty="0" smtClean="0"/>
+              <a:t>(</a:t>
+            </a:r>
+            <a:r>
+              <a:rPr lang="it-IT" sz="1600" dirty="0" smtClean="0">
+                <a:solidFill>
+                  <a:schemeClr val="bg1"/>
+                </a:solidFill>
+              </a:rPr>
+              <a:t>X</a:t>
+            </a:r>
+            <a:r>
+              <a:rPr lang="it-IT" sz="1600" dirty="0" smtClean="0"/>
+              <a:t>)))</a:t>
+            </a:r>
+          </a:p>
+          <a:p>
+            <a:pPr lvl="1">
+              <a:buFont typeface="Arial" pitchFamily="34" charset="0"/>
+              <a:buChar char="•"/>
+            </a:pPr>
+            <a:r>
+              <a:rPr lang="it-IT" sz="1600" dirty="0" smtClean="0"/>
+              <a:t>La regola per cambiare la domanda corrente</a:t>
+            </a:r>
+          </a:p>
+          <a:p>
+            <a:pPr>
+              <a:buFont typeface="Arial" pitchFamily="34" charset="0"/>
+              <a:buChar char="•"/>
+            </a:pPr>
+            <a:r>
+              <a:rPr lang="it-IT" sz="1600" dirty="0" err="1" smtClean="0"/>
+              <a:t>resetAnswer</a:t>
+            </a:r>
+            <a:r>
+              <a:rPr lang="it-IT" sz="1600" dirty="0" smtClean="0"/>
+              <a:t>:-(</a:t>
+            </a:r>
+            <a:r>
+              <a:rPr lang="it-IT" sz="1600" dirty="0" err="1" smtClean="0"/>
+              <a:t>changeAnswere</a:t>
+            </a:r>
+            <a:r>
+              <a:rPr lang="it-IT" sz="1600" dirty="0" smtClean="0"/>
+              <a:t>(1</a:t>
+            </a:r>
+            <a:r>
+              <a:rPr lang="it-IT" sz="1600" dirty="0" smtClean="0"/>
+              <a:t>))</a:t>
+            </a:r>
+          </a:p>
+          <a:p>
+            <a:pPr lvl="1">
+              <a:buFont typeface="Arial" pitchFamily="34" charset="0"/>
+              <a:buChar char="•"/>
+            </a:pPr>
+            <a:r>
+              <a:rPr lang="it-IT" sz="1600" dirty="0" smtClean="0"/>
+              <a:t>Regola per resettare il questionario alla prima domanda</a:t>
+            </a:r>
+          </a:p>
+          <a:p>
+            <a:pPr>
+              <a:buFont typeface="Arial" pitchFamily="34" charset="0"/>
+              <a:buChar char="•"/>
+            </a:pPr>
+            <a:r>
+              <a:rPr lang="it-IT" sz="1600" dirty="0" err="1" smtClean="0"/>
+              <a:t>getActualAnswer</a:t>
+            </a:r>
+            <a:r>
+              <a:rPr lang="it-IT" sz="1600" dirty="0" smtClean="0"/>
+              <a:t>(</a:t>
+            </a:r>
+            <a:r>
+              <a:rPr lang="it-IT" sz="1600" dirty="0" err="1" smtClean="0">
+                <a:solidFill>
+                  <a:schemeClr val="accent6">
+                    <a:lumMod val="75000"/>
+                  </a:schemeClr>
+                </a:solidFill>
+              </a:rPr>
+              <a:t>Ans</a:t>
+            </a:r>
+            <a:r>
+              <a:rPr lang="it-IT" sz="1600" dirty="0" smtClean="0"/>
+              <a:t>):-(</a:t>
+            </a:r>
+            <a:r>
+              <a:rPr lang="it-IT" sz="1600" dirty="0" err="1" smtClean="0"/>
+              <a:t>nextAnswer</a:t>
+            </a:r>
+            <a:r>
+              <a:rPr lang="it-IT" sz="1600" dirty="0" smtClean="0"/>
+              <a:t>(X</a:t>
+            </a:r>
+            <a:r>
+              <a:rPr lang="it-IT" sz="1600" dirty="0" smtClean="0"/>
+              <a:t>),</a:t>
+            </a:r>
+            <a:r>
+              <a:rPr lang="it-IT" sz="1600" dirty="0" err="1" smtClean="0"/>
+              <a:t>clause</a:t>
+            </a:r>
+            <a:r>
+              <a:rPr lang="it-IT" sz="1600" dirty="0" smtClean="0"/>
+              <a:t>(</a:t>
+            </a:r>
+            <a:r>
+              <a:rPr lang="it-IT" sz="1600" dirty="0" err="1" smtClean="0"/>
+              <a:t>answer</a:t>
+            </a:r>
+            <a:r>
+              <a:rPr lang="it-IT" sz="1600" dirty="0" smtClean="0"/>
+              <a:t>(X,</a:t>
+            </a:r>
+            <a:r>
+              <a:rPr lang="it-IT" sz="1600" dirty="0" err="1" smtClean="0">
+                <a:solidFill>
+                  <a:schemeClr val="accent6">
+                    <a:lumMod val="75000"/>
+                  </a:schemeClr>
+                </a:solidFill>
+              </a:rPr>
+              <a:t>Ans</a:t>
+            </a:r>
+            <a:r>
+              <a:rPr lang="it-IT" sz="1600" dirty="0" smtClean="0"/>
+              <a:t>,_,_),_))</a:t>
+            </a:r>
+          </a:p>
+          <a:p>
+            <a:pPr lvl="1">
+              <a:buFont typeface="Arial" pitchFamily="34" charset="0"/>
+              <a:buChar char="•"/>
+            </a:pPr>
+            <a:r>
+              <a:rPr lang="it-IT" sz="1600" dirty="0" smtClean="0"/>
+              <a:t>Regola per ottenere il testo ,</a:t>
+            </a:r>
+            <a:r>
+              <a:rPr lang="it-IT" sz="1600" dirty="0" smtClean="0">
+                <a:solidFill>
+                  <a:schemeClr val="bg1">
+                    <a:lumMod val="95000"/>
+                    <a:lumOff val="5000"/>
+                  </a:schemeClr>
+                </a:solidFill>
+              </a:rPr>
+              <a:t> </a:t>
+            </a:r>
+            <a:r>
+              <a:rPr lang="it-IT" sz="1600" dirty="0" err="1" smtClean="0">
+                <a:solidFill>
+                  <a:schemeClr val="accent6">
+                    <a:lumMod val="75000"/>
+                  </a:schemeClr>
+                </a:solidFill>
+              </a:rPr>
+              <a:t>Ans</a:t>
+            </a:r>
+            <a:r>
+              <a:rPr lang="it-IT" sz="1600" dirty="0" smtClean="0">
+                <a:solidFill>
+                  <a:schemeClr val="bg1">
+                    <a:lumMod val="95000"/>
+                    <a:lumOff val="5000"/>
+                  </a:schemeClr>
+                </a:solidFill>
+              </a:rPr>
+              <a:t> </a:t>
+            </a:r>
+            <a:r>
+              <a:rPr lang="it-IT" sz="1600" dirty="0" smtClean="0"/>
+              <a:t>,</a:t>
+            </a:r>
+            <a:r>
+              <a:rPr lang="it-IT" sz="1600" dirty="0" smtClean="0">
+                <a:solidFill>
+                  <a:schemeClr val="bg1">
+                    <a:lumMod val="95000"/>
+                    <a:lumOff val="5000"/>
+                  </a:schemeClr>
+                </a:solidFill>
+              </a:rPr>
+              <a:t> </a:t>
+            </a:r>
+            <a:r>
+              <a:rPr lang="it-IT" sz="1600" dirty="0" smtClean="0"/>
+              <a:t>della domanda corrente</a:t>
+            </a:r>
+            <a:endParaRPr lang="it-IT" sz="1600" dirty="0" smtClean="0">
+              <a:solidFill>
+                <a:schemeClr val="bg1">
+                  <a:lumMod val="95000"/>
+                  <a:lumOff val="5000"/>
+                </a:schemeClr>
+              </a:solidFill>
+            </a:endParaRPr>
+          </a:p>
+          <a:p>
+            <a:pPr>
+              <a:buFont typeface="Arial" pitchFamily="34" charset="0"/>
+              <a:buChar char="•"/>
+            </a:pPr>
+            <a:r>
+              <a:rPr lang="it-IT" sz="1600" dirty="0" err="1" smtClean="0"/>
+              <a:t>setResponse</a:t>
+            </a:r>
+            <a:r>
+              <a:rPr lang="it-IT" sz="1600" dirty="0" smtClean="0"/>
+              <a:t>(</a:t>
+            </a:r>
+            <a:r>
+              <a:rPr lang="it-IT" sz="1600" dirty="0" smtClean="0">
+                <a:solidFill>
+                  <a:schemeClr val="bg1">
+                    <a:lumMod val="95000"/>
+                    <a:lumOff val="5000"/>
+                  </a:schemeClr>
+                </a:solidFill>
+              </a:rPr>
+              <a:t>X</a:t>
+            </a:r>
+            <a:r>
+              <a:rPr lang="it-IT" sz="1600" dirty="0" smtClean="0"/>
+              <a:t>):-(</a:t>
+            </a:r>
+            <a:r>
+              <a:rPr lang="it-IT" sz="1600" dirty="0" err="1" smtClean="0"/>
+              <a:t>nextAnswer</a:t>
+            </a:r>
+            <a:r>
+              <a:rPr lang="it-IT" sz="1600" dirty="0" smtClean="0"/>
+              <a:t>(Z), </a:t>
+            </a:r>
+            <a:r>
+              <a:rPr lang="it-IT" sz="1600" dirty="0" err="1" smtClean="0"/>
+              <a:t>answer</a:t>
+            </a:r>
+            <a:r>
+              <a:rPr lang="it-IT" sz="1600" dirty="0" smtClean="0"/>
+              <a:t>(Z,_,</a:t>
+            </a:r>
+            <a:r>
+              <a:rPr lang="it-IT" sz="1600" dirty="0" smtClean="0">
+                <a:solidFill>
+                  <a:schemeClr val="bg1">
+                    <a:lumMod val="95000"/>
+                    <a:lumOff val="5000"/>
+                  </a:schemeClr>
+                </a:solidFill>
+              </a:rPr>
+              <a:t>X</a:t>
+            </a:r>
+            <a:r>
+              <a:rPr lang="it-IT" sz="1600" dirty="0" smtClean="0"/>
+              <a:t>,Y),</a:t>
+            </a:r>
+            <a:r>
+              <a:rPr lang="it-IT" sz="1600" dirty="0" err="1" smtClean="0"/>
+              <a:t>changeAnswere</a:t>
+            </a:r>
+            <a:r>
+              <a:rPr lang="it-IT" sz="1600" dirty="0" smtClean="0"/>
+              <a:t>(Y</a:t>
+            </a:r>
+            <a:r>
+              <a:rPr lang="it-IT" sz="1600" dirty="0" smtClean="0"/>
+              <a:t>))</a:t>
+            </a:r>
+          </a:p>
+          <a:p>
+            <a:pPr lvl="1">
+              <a:buFont typeface="Arial" pitchFamily="34" charset="0"/>
+              <a:buChar char="•"/>
+            </a:pPr>
+            <a:r>
+              <a:rPr lang="it-IT" sz="1600" dirty="0" smtClean="0"/>
+              <a:t>Regola per assegnare una risposta </a:t>
+            </a:r>
+            <a:r>
+              <a:rPr lang="it-IT" sz="1600" dirty="0" smtClean="0">
+                <a:solidFill>
+                  <a:schemeClr val="bg1">
+                    <a:lumMod val="95000"/>
+                    <a:lumOff val="5000"/>
+                  </a:schemeClr>
+                </a:solidFill>
+              </a:rPr>
+              <a:t>X</a:t>
+            </a:r>
+            <a:r>
+              <a:rPr lang="it-IT" sz="1600" dirty="0" smtClean="0"/>
+              <a:t> alla domanda corrente</a:t>
+            </a:r>
+          </a:p>
+          <a:p>
+            <a:pPr>
+              <a:buFont typeface="Arial" pitchFamily="34" charset="0"/>
+              <a:buChar char="•"/>
+            </a:pPr>
+            <a:r>
+              <a:rPr lang="it-IT" sz="1600" dirty="0" err="1" smtClean="0"/>
+              <a:t>getResult</a:t>
+            </a:r>
+            <a:r>
+              <a:rPr lang="it-IT" sz="1600" dirty="0" smtClean="0"/>
+              <a:t>('no </a:t>
+            </a:r>
+            <a:r>
+              <a:rPr lang="it-IT" sz="1600" dirty="0" err="1" smtClean="0"/>
+              <a:t>result</a:t>
+            </a:r>
+            <a:r>
+              <a:rPr lang="it-IT" sz="1600" dirty="0" smtClean="0"/>
+              <a:t> </a:t>
+            </a:r>
+            <a:r>
+              <a:rPr lang="it-IT" sz="1600" dirty="0" err="1" smtClean="0"/>
+              <a:t>as</a:t>
+            </a:r>
+            <a:r>
+              <a:rPr lang="it-IT" sz="1600" dirty="0" smtClean="0"/>
+              <a:t> default</a:t>
+            </a:r>
+            <a:r>
+              <a:rPr lang="it-IT" sz="1600" dirty="0" smtClean="0"/>
+              <a:t>')</a:t>
+            </a:r>
+          </a:p>
+          <a:p>
+            <a:pPr lvl="1">
+              <a:buFont typeface="Arial" pitchFamily="34" charset="0"/>
+              <a:buChar char="•"/>
+            </a:pPr>
+            <a:r>
+              <a:rPr lang="it-IT" sz="1600" dirty="0" smtClean="0"/>
+              <a:t>Regola per ottenere il risultato</a:t>
+            </a:r>
+          </a:p>
+          <a:p>
+            <a:pPr>
+              <a:buFont typeface="Arial" pitchFamily="34" charset="0"/>
+              <a:buChar char="•"/>
+            </a:pPr>
+            <a:r>
+              <a:rPr lang="it-IT" sz="1600" dirty="0" err="1" smtClean="0"/>
+              <a:t>getAllAnswer</a:t>
+            </a:r>
+            <a:r>
+              <a:rPr lang="it-IT" sz="1600" dirty="0" smtClean="0"/>
+              <a:t>(</a:t>
+            </a:r>
+            <a:r>
+              <a:rPr lang="it-IT" sz="1600" dirty="0" smtClean="0">
+                <a:solidFill>
+                  <a:schemeClr val="bg1"/>
+                </a:solidFill>
+              </a:rPr>
+              <a:t>A</a:t>
+            </a:r>
+            <a:r>
+              <a:rPr lang="it-IT" sz="1600" dirty="0" smtClean="0"/>
+              <a:t>,</a:t>
+            </a:r>
+            <a:r>
+              <a:rPr lang="it-IT" sz="1600" dirty="0" smtClean="0">
+                <a:solidFill>
+                  <a:schemeClr val="bg1"/>
+                </a:solidFill>
+              </a:rPr>
+              <a:t>B</a:t>
+            </a:r>
+            <a:r>
+              <a:rPr lang="it-IT" sz="1600" dirty="0" smtClean="0"/>
+              <a:t>,</a:t>
+            </a:r>
+            <a:r>
+              <a:rPr lang="it-IT" sz="1600" dirty="0" smtClean="0">
+                <a:solidFill>
+                  <a:schemeClr val="bg1"/>
+                </a:solidFill>
+              </a:rPr>
+              <a:t>C</a:t>
+            </a:r>
+            <a:r>
+              <a:rPr lang="it-IT" sz="1600" dirty="0" smtClean="0"/>
+              <a:t>,</a:t>
+            </a:r>
+            <a:r>
+              <a:rPr lang="it-IT" sz="1600" dirty="0" smtClean="0">
+                <a:solidFill>
+                  <a:schemeClr val="bg1"/>
+                </a:solidFill>
+              </a:rPr>
+              <a:t>D</a:t>
+            </a:r>
+            <a:r>
+              <a:rPr lang="it-IT" sz="1600" dirty="0" smtClean="0"/>
+              <a:t>,</a:t>
+            </a:r>
+            <a:r>
+              <a:rPr lang="it-IT" sz="1600" dirty="0" smtClean="0">
+                <a:solidFill>
+                  <a:schemeClr val="accent6">
+                    <a:lumMod val="75000"/>
+                  </a:schemeClr>
+                </a:solidFill>
+              </a:rPr>
+              <a:t>X</a:t>
+            </a:r>
+            <a:r>
+              <a:rPr lang="it-IT" sz="1600" dirty="0" smtClean="0"/>
+              <a:t>):-(</a:t>
+            </a:r>
+            <a:r>
+              <a:rPr lang="it-IT" sz="1600" dirty="0" err="1" smtClean="0"/>
+              <a:t>clause</a:t>
+            </a:r>
+            <a:r>
+              <a:rPr lang="it-IT" sz="1600" dirty="0" smtClean="0"/>
+              <a:t>(</a:t>
+            </a:r>
+            <a:r>
+              <a:rPr lang="it-IT" sz="1600" dirty="0" err="1" smtClean="0"/>
+              <a:t>answer</a:t>
+            </a:r>
+            <a:r>
+              <a:rPr lang="it-IT" sz="1600" dirty="0" smtClean="0"/>
+              <a:t>(</a:t>
+            </a:r>
+            <a:r>
+              <a:rPr lang="it-IT" sz="1600" dirty="0" smtClean="0">
+                <a:solidFill>
+                  <a:schemeClr val="bg1"/>
+                </a:solidFill>
+              </a:rPr>
+              <a:t>A</a:t>
+            </a:r>
+            <a:r>
+              <a:rPr lang="it-IT" sz="1600" dirty="0" smtClean="0"/>
+              <a:t>,</a:t>
+            </a:r>
+            <a:r>
+              <a:rPr lang="it-IT" sz="1600" dirty="0" smtClean="0">
+                <a:solidFill>
+                  <a:schemeClr val="bg1"/>
+                </a:solidFill>
+              </a:rPr>
+              <a:t>B</a:t>
+            </a:r>
+            <a:r>
+              <a:rPr lang="it-IT" sz="1600" dirty="0" smtClean="0"/>
+              <a:t>,</a:t>
+            </a:r>
+            <a:r>
+              <a:rPr lang="it-IT" sz="1600" dirty="0" smtClean="0">
+                <a:solidFill>
+                  <a:schemeClr val="bg1"/>
+                </a:solidFill>
+              </a:rPr>
+              <a:t>C</a:t>
+            </a:r>
+            <a:r>
+              <a:rPr lang="it-IT" sz="1600" dirty="0" smtClean="0"/>
+              <a:t>,</a:t>
+            </a:r>
+            <a:r>
+              <a:rPr lang="it-IT" sz="1600" dirty="0" smtClean="0">
+                <a:solidFill>
+                  <a:schemeClr val="bg1"/>
+                </a:solidFill>
+              </a:rPr>
+              <a:t>D</a:t>
+            </a:r>
+            <a:r>
+              <a:rPr lang="it-IT" sz="1600" dirty="0" smtClean="0"/>
+              <a:t>),Z),format(</a:t>
+            </a:r>
+            <a:r>
+              <a:rPr lang="it-IT" sz="1600" dirty="0" err="1" smtClean="0"/>
+              <a:t>atom</a:t>
+            </a:r>
+            <a:r>
+              <a:rPr lang="it-IT" sz="1600" dirty="0" smtClean="0"/>
+              <a:t>(</a:t>
+            </a:r>
+            <a:r>
+              <a:rPr lang="it-IT" sz="1600" dirty="0" smtClean="0">
+                <a:solidFill>
+                  <a:schemeClr val="accent6">
+                    <a:lumMod val="75000"/>
+                  </a:schemeClr>
+                </a:solidFill>
+              </a:rPr>
+              <a:t>X</a:t>
+            </a:r>
+            <a:r>
+              <a:rPr lang="it-IT" sz="1600" dirty="0" smtClean="0"/>
+              <a:t>), "</a:t>
+            </a:r>
+            <a:r>
+              <a:rPr lang="it-IT" sz="1600" dirty="0" err="1" smtClean="0"/>
+              <a:t>~w</a:t>
+            </a:r>
+            <a:r>
+              <a:rPr lang="it-IT" sz="1600" dirty="0" smtClean="0"/>
+              <a:t>",Z</a:t>
+            </a:r>
+            <a:r>
+              <a:rPr lang="it-IT" sz="1600" dirty="0" smtClean="0"/>
+              <a:t>))</a:t>
+            </a:r>
+          </a:p>
+          <a:p>
+            <a:pPr lvl="1">
+              <a:buFont typeface="Arial" pitchFamily="34" charset="0"/>
+              <a:buChar char="•"/>
+            </a:pPr>
+            <a:r>
+              <a:rPr lang="it-IT" sz="1600" dirty="0" smtClean="0"/>
+              <a:t>Regola per ottenere la lista, </a:t>
+            </a:r>
+            <a:r>
+              <a:rPr lang="it-IT" sz="1600" dirty="0" smtClean="0">
+                <a:solidFill>
+                  <a:schemeClr val="accent6">
+                    <a:lumMod val="75000"/>
+                  </a:schemeClr>
+                </a:solidFill>
+              </a:rPr>
+              <a:t>X</a:t>
+            </a:r>
+            <a:r>
+              <a:rPr lang="it-IT" sz="1600" dirty="0" smtClean="0"/>
+              <a:t>, di tutte le domande che corrispondono ai parametri</a:t>
+            </a:r>
+          </a:p>
+          <a:p>
+            <a:pPr lvl="2">
+              <a:buFont typeface="Arial" pitchFamily="34" charset="0"/>
+              <a:buChar char="•"/>
+            </a:pPr>
+            <a:r>
+              <a:rPr lang="it-IT" sz="1600" dirty="0" smtClean="0">
+                <a:solidFill>
+                  <a:schemeClr val="bg1"/>
+                </a:solidFill>
+              </a:rPr>
+              <a:t>A</a:t>
+            </a:r>
+            <a:r>
+              <a:rPr lang="it-IT" sz="1600" dirty="0" smtClean="0"/>
+              <a:t> </a:t>
+            </a:r>
+            <a:r>
+              <a:rPr lang="it-IT" sz="1600" dirty="0" smtClean="0">
+                <a:sym typeface="Wingdings" pitchFamily="2" charset="2"/>
+              </a:rPr>
+              <a:t> ID domanda</a:t>
+            </a:r>
+          </a:p>
+          <a:p>
+            <a:pPr lvl="2">
+              <a:buFont typeface="Arial" pitchFamily="34" charset="0"/>
+              <a:buChar char="•"/>
+            </a:pPr>
+            <a:r>
+              <a:rPr lang="it-IT" sz="1600" dirty="0" smtClean="0">
+                <a:solidFill>
+                  <a:schemeClr val="bg1"/>
+                </a:solidFill>
+                <a:sym typeface="Wingdings" pitchFamily="2" charset="2"/>
+              </a:rPr>
+              <a:t>B</a:t>
+            </a:r>
+            <a:r>
+              <a:rPr lang="it-IT" sz="1600" dirty="0" smtClean="0">
+                <a:sym typeface="Wingdings" pitchFamily="2" charset="2"/>
+              </a:rPr>
+              <a:t>  Testo domanda</a:t>
+            </a:r>
+          </a:p>
+          <a:p>
+            <a:pPr lvl="2">
+              <a:buFont typeface="Arial" pitchFamily="34" charset="0"/>
+              <a:buChar char="•"/>
+            </a:pPr>
+            <a:r>
+              <a:rPr lang="it-IT" sz="1600" dirty="0" smtClean="0">
+                <a:solidFill>
+                  <a:schemeClr val="bg1"/>
+                </a:solidFill>
+                <a:sym typeface="Wingdings" pitchFamily="2" charset="2"/>
+              </a:rPr>
+              <a:t>C</a:t>
+            </a:r>
+            <a:r>
+              <a:rPr lang="it-IT" sz="1600" dirty="0" smtClean="0">
+                <a:sym typeface="Wingdings" pitchFamily="2" charset="2"/>
+              </a:rPr>
+              <a:t> </a:t>
+            </a:r>
+            <a:r>
+              <a:rPr lang="it-IT" sz="1600" dirty="0" smtClean="0">
+                <a:sym typeface="Wingdings" pitchFamily="2" charset="2"/>
+              </a:rPr>
+              <a:t> Risposta</a:t>
+            </a:r>
+            <a:endParaRPr lang="it-IT" sz="1600" dirty="0" smtClean="0">
+              <a:sym typeface="Wingdings" pitchFamily="2" charset="2"/>
+            </a:endParaRPr>
+          </a:p>
+          <a:p>
+            <a:pPr lvl="2">
+              <a:buFont typeface="Arial" pitchFamily="34" charset="0"/>
+              <a:buChar char="•"/>
+            </a:pPr>
+            <a:r>
+              <a:rPr lang="it-IT" sz="1600" dirty="0" smtClean="0">
+                <a:solidFill>
+                  <a:schemeClr val="bg1"/>
+                </a:solidFill>
+                <a:sym typeface="Wingdings" pitchFamily="2" charset="2"/>
+              </a:rPr>
+              <a:t>D</a:t>
+            </a:r>
+            <a:r>
+              <a:rPr lang="it-IT" sz="1600" dirty="0" smtClean="0">
+                <a:sym typeface="Wingdings" pitchFamily="2" charset="2"/>
+              </a:rPr>
+              <a:t>  ID prossima domanda</a:t>
+            </a:r>
+            <a:endParaRPr lang="it-IT" sz="1600" dirty="0"/>
+          </a:p>
+        </p:txBody>
+      </p:sp>
+      <p:sp>
+        <p:nvSpPr>
+          <p:cNvPr id="4" name="CasellaDiTesto 3"/>
+          <p:cNvSpPr txBox="1"/>
+          <p:nvPr/>
+        </p:nvSpPr>
+        <p:spPr>
+          <a:xfrm>
+            <a:off x="5399584" y="6119336"/>
+            <a:ext cx="3744416" cy="923330"/>
+          </a:xfrm>
+          <a:prstGeom prst="rect">
+            <a:avLst/>
+          </a:prstGeom>
+          <a:noFill/>
+        </p:spPr>
+        <p:txBody>
+          <a:bodyPr wrap="square" rtlCol="0">
+            <a:spAutoFit/>
+          </a:bodyPr>
+          <a:lstStyle/>
+          <a:p>
+            <a:r>
+              <a:rPr lang="it-IT" sz="1200" dirty="0" smtClean="0"/>
+              <a:t>La classe </a:t>
+            </a:r>
+            <a:r>
+              <a:rPr lang="it-IT" sz="1200" dirty="0" err="1" smtClean="0"/>
+              <a:t>node.js</a:t>
+            </a:r>
+            <a:r>
+              <a:rPr lang="it-IT" sz="1200" dirty="0" smtClean="0"/>
+              <a:t> </a:t>
+            </a:r>
+            <a:r>
+              <a:rPr lang="it-IT" sz="1200" dirty="0" err="1" smtClean="0"/>
+              <a:t>PorlogEngine</a:t>
+            </a:r>
+            <a:r>
+              <a:rPr lang="it-IT" sz="1200" dirty="0" smtClean="0"/>
+              <a:t> usa le seguenti regole usando le variabili delle stesse come </a:t>
+            </a:r>
+            <a:r>
+              <a:rPr lang="it-IT" sz="1200" dirty="0" smtClean="0">
+                <a:solidFill>
+                  <a:schemeClr val="bg1"/>
+                </a:solidFill>
+              </a:rPr>
+              <a:t>input </a:t>
+            </a:r>
+            <a:r>
+              <a:rPr lang="it-IT" sz="1200" dirty="0" smtClean="0"/>
+              <a:t>e</a:t>
+            </a:r>
+            <a:r>
+              <a:rPr lang="it-IT" sz="1200" dirty="0" smtClean="0">
+                <a:solidFill>
+                  <a:schemeClr val="bg1"/>
+                </a:solidFill>
+              </a:rPr>
+              <a:t> </a:t>
+            </a:r>
+            <a:r>
+              <a:rPr lang="it-IT" sz="1200" dirty="0" smtClean="0">
+                <a:solidFill>
+                  <a:schemeClr val="accent6">
+                    <a:lumMod val="75000"/>
+                  </a:schemeClr>
+                </a:solidFill>
+              </a:rPr>
+              <a:t>output</a:t>
+            </a:r>
+            <a:endParaRPr lang="it-IT" sz="1200" dirty="0" smtClean="0">
+              <a:solidFill>
+                <a:schemeClr val="accent6">
+                  <a:lumMod val="75000"/>
+                </a:schemeClr>
+              </a:solidFill>
+            </a:endParaRPr>
+          </a:p>
+          <a:p>
+            <a:endParaRPr lang="it-IT" dirty="0"/>
           </a:p>
         </p:txBody>
       </p:sp>
@@ -4353,6 +5442,838 @@
   <p:clrMapOvr>
     <a:masterClrMapping/>
   </p:clrMapOvr>
+  <p:timing>
+    <p:tnLst>
+      <p:par>
+        <p:cTn id="1" dur="indefinite" restart="never" nodeType="tmRoot"/>
+      </p:par>
+    </p:tnLst>
+  </p:timing>
+</p:sld>
+</file>
+
+<file path=ppt/slides/slide6.xml><?xml version="1.0" encoding="utf-8"?>
+<p:sld xmlns:a="http://schemas.openxmlformats.org/drawingml/2006/main" xmlns:r="http://schemas.openxmlformats.org/officeDocument/2006/relationships" xmlns:p="http://schemas.openxmlformats.org/presentationml/2006/main">
+  <p:cSld>
+    <p:spTree>
+      <p:nvGrpSpPr>
+        <p:cNvPr id="1" name=""/>
+        <p:cNvGrpSpPr/>
+        <p:nvPr/>
+      </p:nvGrpSpPr>
+      <p:grpSpPr>
+        <a:xfrm>
+          <a:off x="0" y="0"/>
+          <a:ext cx="0" cy="0"/>
+          <a:chOff x="0" y="0"/>
+          <a:chExt cx="0" cy="0"/>
+        </a:xfrm>
+      </p:grpSpPr>
+      <p:sp>
+        <p:nvSpPr>
+          <p:cNvPr id="16" name="Title 15"/>
+          <p:cNvSpPr>
+            <a:spLocks noGrp="1"/>
+          </p:cNvSpPr>
+          <p:nvPr>
+            <p:ph type="title"/>
+          </p:nvPr>
+        </p:nvSpPr>
+        <p:spPr/>
+        <p:txBody>
+          <a:bodyPr/>
+          <a:lstStyle/>
+          <a:p>
+            <a:r>
+              <a:rPr lang="it-IT" dirty="0" smtClean="0"/>
+              <a:t>Survey </a:t>
+            </a:r>
+            <a:r>
+              <a:rPr lang="it-IT" dirty="0" err="1" smtClean="0"/>
+              <a:t>engine</a:t>
+            </a:r>
+            <a:r>
+              <a:rPr lang="it-IT" dirty="0" smtClean="0"/>
+              <a:t> </a:t>
+            </a:r>
+            <a:r>
+              <a:rPr lang="it-IT" dirty="0" smtClean="0"/>
+              <a:t>– </a:t>
+            </a:r>
+            <a:r>
+              <a:rPr lang="it-IT" dirty="0" err="1" smtClean="0"/>
+              <a:t>prolog</a:t>
+            </a:r>
+            <a:endParaRPr lang="it-IT" dirty="0"/>
+          </a:p>
+        </p:txBody>
+      </p:sp>
+      <p:sp>
+        <p:nvSpPr>
+          <p:cNvPr id="3" name="Rettangolo 2"/>
+          <p:cNvSpPr/>
+          <p:nvPr/>
+        </p:nvSpPr>
+        <p:spPr>
+          <a:xfrm>
+            <a:off x="251520" y="1595021"/>
+            <a:ext cx="8604448" cy="5262979"/>
+          </a:xfrm>
+          <a:prstGeom prst="rect">
+            <a:avLst/>
+          </a:prstGeom>
+        </p:spPr>
+        <p:txBody>
+          <a:bodyPr wrap="square">
+            <a:spAutoFit/>
+          </a:bodyPr>
+          <a:lstStyle/>
+          <a:p>
+            <a:r>
+              <a:rPr lang="it-IT" sz="1600" dirty="0" smtClean="0"/>
+              <a:t>A disposizione di ogni utente vi sono anche delle regole per gestire la cache delle risposte,</a:t>
+            </a:r>
+          </a:p>
+          <a:p>
+            <a:r>
+              <a:rPr lang="it-IT" sz="1600" dirty="0" smtClean="0"/>
+              <a:t>la base di conoscenza usa la regola: </a:t>
+            </a:r>
+            <a:r>
+              <a:rPr lang="it-IT" sz="1600" dirty="0" smtClean="0"/>
+              <a:t>cache(</a:t>
+            </a:r>
+            <a:r>
+              <a:rPr lang="it-IT" sz="1600" dirty="0" smtClean="0">
+                <a:solidFill>
+                  <a:srgbClr val="FFC000"/>
+                </a:solidFill>
+              </a:rPr>
+              <a:t>NM</a:t>
+            </a:r>
+            <a:r>
+              <a:rPr lang="it-IT" sz="1600" dirty="0" smtClean="0"/>
+              <a:t>,</a:t>
+            </a:r>
+            <a:r>
+              <a:rPr lang="it-IT" sz="1600" dirty="0" smtClean="0">
+                <a:solidFill>
+                  <a:schemeClr val="tx2">
+                    <a:lumMod val="50000"/>
+                  </a:schemeClr>
+                </a:solidFill>
+              </a:rPr>
+              <a:t>ID</a:t>
+            </a:r>
+            <a:r>
+              <a:rPr lang="it-IT" sz="1600" dirty="0" smtClean="0"/>
+              <a:t>,</a:t>
+            </a:r>
+            <a:r>
+              <a:rPr lang="it-IT" sz="1600" dirty="0" smtClean="0">
+                <a:solidFill>
+                  <a:schemeClr val="accent6">
+                    <a:lumMod val="75000"/>
+                  </a:schemeClr>
+                </a:solidFill>
+              </a:rPr>
+              <a:t>RISP</a:t>
+            </a:r>
+            <a:r>
+              <a:rPr lang="it-IT" sz="1600" dirty="0" smtClean="0"/>
+              <a:t>,</a:t>
+            </a:r>
+            <a:r>
+              <a:rPr lang="it-IT" sz="1600" dirty="0" smtClean="0">
+                <a:solidFill>
+                  <a:schemeClr val="bg1"/>
+                </a:solidFill>
+              </a:rPr>
+              <a:t>C</a:t>
+            </a:r>
+            <a:r>
+              <a:rPr lang="it-IT" sz="1600" dirty="0" smtClean="0"/>
+              <a:t>) dove:</a:t>
+            </a:r>
+          </a:p>
+          <a:p>
+            <a:endParaRPr lang="it-IT" sz="1600" dirty="0" smtClean="0"/>
+          </a:p>
+          <a:p>
+            <a:pPr>
+              <a:buFont typeface="Arial" pitchFamily="34" charset="0"/>
+              <a:buChar char="•"/>
+            </a:pPr>
+            <a:r>
+              <a:rPr lang="it-IT" sz="1600" dirty="0" smtClean="0">
+                <a:solidFill>
+                  <a:srgbClr val="FFC000"/>
+                </a:solidFill>
+              </a:rPr>
+              <a:t>NM</a:t>
+            </a:r>
+            <a:r>
+              <a:rPr lang="it-IT" sz="1600" dirty="0" smtClean="0"/>
+              <a:t> è il nome del modulo che racchiude le domande di un questionario</a:t>
+            </a:r>
+          </a:p>
+          <a:p>
+            <a:pPr>
+              <a:buFont typeface="Arial" pitchFamily="34" charset="0"/>
+              <a:buChar char="•"/>
+            </a:pPr>
+            <a:r>
+              <a:rPr lang="it-IT" sz="1600" dirty="0" smtClean="0">
+                <a:solidFill>
+                  <a:schemeClr val="tx2">
+                    <a:lumMod val="50000"/>
+                  </a:schemeClr>
+                </a:solidFill>
+              </a:rPr>
+              <a:t>ID</a:t>
+            </a:r>
+            <a:r>
+              <a:rPr lang="it-IT" sz="1600" dirty="0" smtClean="0"/>
+              <a:t> è l’identificatore della domanda a cui si fa riferimento tra le domande del questionario</a:t>
+            </a:r>
+          </a:p>
+          <a:p>
+            <a:pPr>
+              <a:buFont typeface="Arial" pitchFamily="34" charset="0"/>
+              <a:buChar char="•"/>
+            </a:pPr>
+            <a:r>
+              <a:rPr lang="it-IT" sz="1600" dirty="0" smtClean="0">
+                <a:solidFill>
+                  <a:schemeClr val="accent6">
+                    <a:lumMod val="75000"/>
+                  </a:schemeClr>
+                </a:solidFill>
+              </a:rPr>
+              <a:t>RISP</a:t>
+            </a:r>
+            <a:r>
+              <a:rPr lang="it-IT" sz="1600" dirty="0" smtClean="0"/>
+              <a:t> è la risposta fornita dall’utente</a:t>
+            </a:r>
+          </a:p>
+          <a:p>
+            <a:pPr>
+              <a:buFont typeface="Arial" pitchFamily="34" charset="0"/>
+              <a:buChar char="•"/>
+            </a:pPr>
+            <a:r>
+              <a:rPr lang="it-IT" sz="1600" dirty="0" smtClean="0">
+                <a:solidFill>
+                  <a:schemeClr val="bg1"/>
+                </a:solidFill>
+              </a:rPr>
+              <a:t>C</a:t>
+            </a:r>
+            <a:r>
+              <a:rPr lang="it-IT" sz="1600" dirty="0" smtClean="0"/>
+              <a:t> è il numero di volte delle ricorrenze della tripla precedente </a:t>
+            </a:r>
+          </a:p>
+          <a:p>
+            <a:endParaRPr lang="it-IT" sz="1600" dirty="0" smtClean="0"/>
+          </a:p>
+          <a:p>
+            <a:r>
+              <a:rPr lang="it-IT" sz="1600" dirty="0" smtClean="0"/>
+              <a:t>Le regole per utilizzate dal programma </a:t>
+            </a:r>
+            <a:r>
+              <a:rPr lang="it-IT" sz="1600" dirty="0" err="1" smtClean="0"/>
+              <a:t>Node</a:t>
+            </a:r>
+            <a:r>
+              <a:rPr lang="it-IT" sz="1600" dirty="0" smtClean="0"/>
+              <a:t> </a:t>
+            </a:r>
+            <a:r>
+              <a:rPr lang="it-IT" sz="1600" dirty="0" smtClean="0"/>
+              <a:t>sono per gestire la cache in </a:t>
+            </a:r>
+            <a:r>
+              <a:rPr lang="it-IT" sz="1600" dirty="0" err="1" smtClean="0"/>
+              <a:t>prolog</a:t>
+            </a:r>
+            <a:r>
+              <a:rPr lang="it-IT" sz="1600" dirty="0" smtClean="0"/>
+              <a:t> sono:</a:t>
+            </a:r>
+          </a:p>
+          <a:p>
+            <a:pPr>
+              <a:buFont typeface="Arial" pitchFamily="34" charset="0"/>
+              <a:buChar char="•"/>
+            </a:pPr>
+            <a:r>
+              <a:rPr lang="it-IT" sz="1600" dirty="0" err="1" smtClean="0"/>
+              <a:t>addCache</a:t>
+            </a:r>
+            <a:r>
+              <a:rPr lang="it-IT" sz="1600" dirty="0" smtClean="0"/>
+              <a:t>(</a:t>
+            </a:r>
+            <a:r>
+              <a:rPr lang="it-IT" sz="1600" dirty="0" smtClean="0">
+                <a:solidFill>
+                  <a:srgbClr val="FFC000"/>
+                </a:solidFill>
+              </a:rPr>
+              <a:t>NM</a:t>
+            </a:r>
+            <a:r>
+              <a:rPr lang="it-IT" sz="1600" dirty="0" smtClean="0"/>
+              <a:t>,</a:t>
+            </a:r>
+            <a:r>
+              <a:rPr lang="it-IT" sz="1600" dirty="0" smtClean="0">
+                <a:solidFill>
+                  <a:schemeClr val="tx2">
+                    <a:lumMod val="50000"/>
+                  </a:schemeClr>
+                </a:solidFill>
+              </a:rPr>
+              <a:t>ID</a:t>
+            </a:r>
+            <a:r>
+              <a:rPr lang="it-IT" sz="1600" dirty="0" smtClean="0"/>
+              <a:t>,</a:t>
+            </a:r>
+            <a:r>
+              <a:rPr lang="it-IT" sz="1600" dirty="0" smtClean="0">
+                <a:solidFill>
+                  <a:schemeClr val="accent6">
+                    <a:lumMod val="75000"/>
+                  </a:schemeClr>
+                </a:solidFill>
+              </a:rPr>
+              <a:t>RISP</a:t>
+            </a:r>
+            <a:r>
+              <a:rPr lang="it-IT" sz="1600" dirty="0" smtClean="0"/>
+              <a:t>,</a:t>
+            </a:r>
+            <a:r>
+              <a:rPr lang="it-IT" sz="1600" dirty="0" smtClean="0">
+                <a:solidFill>
+                  <a:schemeClr val="bg1"/>
+                </a:solidFill>
+              </a:rPr>
+              <a:t>C</a:t>
+            </a:r>
+            <a:r>
+              <a:rPr lang="it-IT" sz="1600" dirty="0" smtClean="0"/>
+              <a:t>)</a:t>
+            </a:r>
+          </a:p>
+          <a:p>
+            <a:pPr lvl="1">
+              <a:buFont typeface="Arial" pitchFamily="34" charset="0"/>
+              <a:buChar char="•"/>
+            </a:pPr>
+            <a:r>
+              <a:rPr lang="it-IT" sz="1600" dirty="0" smtClean="0"/>
+              <a:t>Aggiunge una risposta relativa ad una domanda alla cache.</a:t>
+            </a:r>
+          </a:p>
+          <a:p>
+            <a:pPr lvl="1">
+              <a:buFont typeface="Arial" pitchFamily="34" charset="0"/>
+              <a:buChar char="•"/>
+            </a:pPr>
+            <a:r>
+              <a:rPr lang="it-IT" sz="1600" dirty="0" smtClean="0"/>
+              <a:t>Nello specifico </a:t>
+            </a:r>
+            <a:r>
+              <a:rPr lang="it-IT" sz="1600" dirty="0" smtClean="0">
+                <a:solidFill>
+                  <a:schemeClr val="bg1"/>
+                </a:solidFill>
+              </a:rPr>
+              <a:t>C</a:t>
+            </a:r>
+            <a:r>
+              <a:rPr lang="it-IT" sz="1600" dirty="0" smtClean="0"/>
+              <a:t> viene usato come variabile di output, che verrà gestita e generata direttamente dalle regole </a:t>
+            </a:r>
+            <a:r>
+              <a:rPr lang="it-IT" sz="1600" dirty="0" err="1" smtClean="0"/>
+              <a:t>prolog</a:t>
+            </a:r>
+            <a:r>
+              <a:rPr lang="it-IT" sz="1600" dirty="0" smtClean="0"/>
+              <a:t>.</a:t>
+            </a:r>
+          </a:p>
+          <a:p>
+            <a:pPr>
+              <a:buFont typeface="Arial" pitchFamily="34" charset="0"/>
+              <a:buChar char="•"/>
+            </a:pPr>
+            <a:r>
+              <a:rPr lang="it-IT" sz="1600" dirty="0" err="1" smtClean="0"/>
+              <a:t>getCache</a:t>
+            </a:r>
+            <a:r>
+              <a:rPr lang="it-IT" sz="1600" dirty="0" smtClean="0"/>
+              <a:t>(</a:t>
+            </a:r>
+            <a:r>
+              <a:rPr lang="it-IT" sz="1600" dirty="0" smtClean="0">
+                <a:solidFill>
+                  <a:srgbClr val="FFC000"/>
+                </a:solidFill>
+              </a:rPr>
+              <a:t>NM</a:t>
+            </a:r>
+            <a:r>
+              <a:rPr lang="it-IT" sz="1600" dirty="0" smtClean="0"/>
+              <a:t>,</a:t>
+            </a:r>
+            <a:r>
+              <a:rPr lang="it-IT" sz="1600" dirty="0" smtClean="0">
+                <a:solidFill>
+                  <a:schemeClr val="tx2">
+                    <a:lumMod val="50000"/>
+                  </a:schemeClr>
+                </a:solidFill>
+              </a:rPr>
+              <a:t>ID</a:t>
+            </a:r>
+            <a:r>
+              <a:rPr lang="it-IT" sz="1600" dirty="0" smtClean="0"/>
+              <a:t>,</a:t>
+            </a:r>
+            <a:r>
+              <a:rPr lang="it-IT" sz="1600" dirty="0" smtClean="0">
+                <a:solidFill>
+                  <a:srgbClr val="C00000"/>
+                </a:solidFill>
+              </a:rPr>
+              <a:t>X</a:t>
+            </a:r>
+            <a:r>
+              <a:rPr lang="it-IT" sz="1600" dirty="0" smtClean="0"/>
+              <a:t>)</a:t>
+            </a:r>
+          </a:p>
+          <a:p>
+            <a:pPr lvl="1">
+              <a:buFont typeface="Arial" pitchFamily="34" charset="0"/>
+              <a:buChar char="•"/>
+            </a:pPr>
+            <a:r>
+              <a:rPr lang="it-IT" sz="1600" dirty="0" smtClean="0"/>
+              <a:t>Usata per ottenere l’elenco, </a:t>
+            </a:r>
+            <a:r>
+              <a:rPr lang="it-IT" sz="1600" dirty="0" smtClean="0">
+                <a:solidFill>
+                  <a:srgbClr val="C00000"/>
+                </a:solidFill>
+              </a:rPr>
+              <a:t>X</a:t>
+            </a:r>
+            <a:r>
+              <a:rPr lang="it-IT" sz="1600" dirty="0" smtClean="0"/>
+              <a:t>, in ordine decrescente in base al parametro </a:t>
+            </a:r>
+            <a:r>
+              <a:rPr lang="it-IT" sz="1600" dirty="0" smtClean="0">
+                <a:solidFill>
+                  <a:schemeClr val="bg1"/>
+                </a:solidFill>
+              </a:rPr>
+              <a:t>C</a:t>
+            </a:r>
+            <a:r>
+              <a:rPr lang="it-IT" sz="1600" dirty="0" smtClean="0"/>
+              <a:t>, di tutte le risposte ad una certa domanda.</a:t>
+            </a:r>
+          </a:p>
+          <a:p>
+            <a:pPr lvl="1"/>
+            <a:endParaRPr lang="it-IT" sz="1600" dirty="0" smtClean="0"/>
+          </a:p>
+          <a:p>
+            <a:pPr>
+              <a:buFont typeface="Arial" pitchFamily="34" charset="0"/>
+              <a:buChar char="•"/>
+            </a:pPr>
+            <a:endParaRPr lang="it-IT" sz="1600" dirty="0" smtClean="0"/>
+          </a:p>
+          <a:p>
+            <a:endParaRPr lang="it-IT" sz="1600" dirty="0" smtClean="0"/>
+          </a:p>
+          <a:p>
+            <a:endParaRPr lang="it-IT" sz="1600" dirty="0" smtClean="0"/>
+          </a:p>
+          <a:p>
+            <a:endParaRPr lang="it-IT" sz="1600" dirty="0" smtClean="0"/>
+          </a:p>
+        </p:txBody>
+      </p:sp>
+    </p:spTree>
+  </p:cSld>
+  <p:clrMapOvr>
+    <a:masterClrMapping/>
+  </p:clrMapOvr>
+  <p:timing>
+    <p:tnLst>
+      <p:par>
+        <p:cTn id="1" dur="indefinite" restart="never" nodeType="tmRoot"/>
+      </p:par>
+    </p:tnLst>
+  </p:timing>
+</p:sld>
+</file>
+
+<file path=ppt/slides/slide7.xml><?xml version="1.0" encoding="utf-8"?>
+<p:sld xmlns:a="http://schemas.openxmlformats.org/drawingml/2006/main" xmlns:r="http://schemas.openxmlformats.org/officeDocument/2006/relationships" xmlns:p="http://schemas.openxmlformats.org/presentationml/2006/main">
+  <p:cSld>
+    <p:spTree>
+      <p:nvGrpSpPr>
+        <p:cNvPr id="1" name=""/>
+        <p:cNvGrpSpPr/>
+        <p:nvPr/>
+      </p:nvGrpSpPr>
+      <p:grpSpPr>
+        <a:xfrm>
+          <a:off x="0" y="0"/>
+          <a:ext cx="0" cy="0"/>
+          <a:chOff x="0" y="0"/>
+          <a:chExt cx="0" cy="0"/>
+        </a:xfrm>
+      </p:grpSpPr>
+      <p:sp>
+        <p:nvSpPr>
+          <p:cNvPr id="16" name="Title 15"/>
+          <p:cNvSpPr>
+            <a:spLocks noGrp="1"/>
+          </p:cNvSpPr>
+          <p:nvPr>
+            <p:ph type="title"/>
+          </p:nvPr>
+        </p:nvSpPr>
+        <p:spPr>
+          <a:xfrm>
+            <a:off x="457200" y="274638"/>
+            <a:ext cx="8291264" cy="1143000"/>
+          </a:xfrm>
+        </p:spPr>
+        <p:txBody>
+          <a:bodyPr>
+            <a:normAutofit/>
+          </a:bodyPr>
+          <a:lstStyle/>
+          <a:p>
+            <a:r>
+              <a:rPr lang="it-IT" dirty="0" smtClean="0"/>
+              <a:t>Survey </a:t>
+            </a:r>
+            <a:r>
+              <a:rPr lang="it-IT" dirty="0" err="1" smtClean="0"/>
+              <a:t>engine</a:t>
+            </a:r>
+            <a:r>
+              <a:rPr lang="it-IT" dirty="0" smtClean="0"/>
+              <a:t> </a:t>
+            </a:r>
+            <a:r>
+              <a:rPr lang="it-IT" dirty="0" smtClean="0"/>
+              <a:t>– conclusioni</a:t>
+            </a:r>
+            <a:endParaRPr lang="it-IT" dirty="0"/>
+          </a:p>
+        </p:txBody>
+      </p:sp>
+      <p:sp>
+        <p:nvSpPr>
+          <p:cNvPr id="3" name="Rettangolo 2"/>
+          <p:cNvSpPr/>
+          <p:nvPr/>
+        </p:nvSpPr>
+        <p:spPr>
+          <a:xfrm>
+            <a:off x="251520" y="1595021"/>
+            <a:ext cx="8604448" cy="1323439"/>
+          </a:xfrm>
+          <a:prstGeom prst="rect">
+            <a:avLst/>
+          </a:prstGeom>
+        </p:spPr>
+        <p:txBody>
+          <a:bodyPr wrap="square">
+            <a:spAutoFit/>
+          </a:bodyPr>
+          <a:lstStyle/>
+          <a:p>
+            <a:pPr lvl="1"/>
+            <a:endParaRPr lang="it-IT" sz="1600" dirty="0" smtClean="0"/>
+          </a:p>
+          <a:p>
+            <a:pPr>
+              <a:buFont typeface="Arial" pitchFamily="34" charset="0"/>
+              <a:buChar char="•"/>
+            </a:pPr>
+            <a:endParaRPr lang="it-IT" sz="1600" dirty="0" smtClean="0"/>
+          </a:p>
+          <a:p>
+            <a:endParaRPr lang="it-IT" sz="1600" dirty="0" smtClean="0"/>
+          </a:p>
+          <a:p>
+            <a:endParaRPr lang="it-IT" sz="1600" dirty="0" smtClean="0"/>
+          </a:p>
+          <a:p>
+            <a:endParaRPr lang="it-IT" sz="1600" dirty="0" smtClean="0"/>
+          </a:p>
+        </p:txBody>
+      </p:sp>
+      <p:sp>
+        <p:nvSpPr>
+          <p:cNvPr id="4" name="CasellaDiTesto 3"/>
+          <p:cNvSpPr txBox="1"/>
+          <p:nvPr/>
+        </p:nvSpPr>
+        <p:spPr>
+          <a:xfrm>
+            <a:off x="467544" y="1340768"/>
+            <a:ext cx="8136904" cy="5355312"/>
+          </a:xfrm>
+          <a:prstGeom prst="rect">
+            <a:avLst/>
+          </a:prstGeom>
+          <a:noFill/>
+        </p:spPr>
+        <p:txBody>
+          <a:bodyPr wrap="square" rtlCol="0">
+            <a:spAutoFit/>
+          </a:bodyPr>
+          <a:lstStyle/>
+          <a:p>
+            <a:r>
+              <a:rPr lang="it-IT" dirty="0" smtClean="0"/>
+              <a:t>Il punto forte di questo progetto è l’unione di due tecnologie  che singolarmente hanno caratteristiche cruciali, che rispettivamente l’una con l’altra non possiedono.</a:t>
+            </a:r>
+          </a:p>
+          <a:p>
+            <a:r>
+              <a:rPr lang="it-IT" dirty="0" smtClean="0"/>
+              <a:t>	</a:t>
+            </a:r>
+            <a:r>
+              <a:rPr lang="it-IT" dirty="0" err="1" smtClean="0"/>
+              <a:t>Node.js</a:t>
+            </a:r>
+            <a:r>
+              <a:rPr lang="it-IT" dirty="0" smtClean="0"/>
+              <a:t> che adotta un approccio funzionale e che permette di offrire 	servizi web raggiungibili tramite il protocollo HTTP.</a:t>
+            </a:r>
+          </a:p>
+          <a:p>
+            <a:r>
+              <a:rPr lang="it-IT" dirty="0" smtClean="0"/>
+              <a:t>	</a:t>
+            </a:r>
+            <a:r>
+              <a:rPr lang="it-IT" dirty="0" err="1" smtClean="0"/>
+              <a:t>Prolog</a:t>
+            </a:r>
+            <a:r>
+              <a:rPr lang="it-IT" dirty="0" smtClean="0"/>
+              <a:t>, linguaggio logico e permette l’esecuzione di codice non 	deterministico e la gestione di regole di inferenza.</a:t>
+            </a:r>
+          </a:p>
+          <a:p>
+            <a:endParaRPr lang="it-IT" dirty="0" smtClean="0"/>
+          </a:p>
+          <a:p>
+            <a:r>
+              <a:rPr lang="it-IT" dirty="0" smtClean="0"/>
+              <a:t>Il progetto fornisce uno strumento in grado di generare questionari intelligenti, che oltre alla velocità e semplicità di stesura, permettono:</a:t>
+            </a:r>
+          </a:p>
+          <a:p>
+            <a:pPr>
+              <a:buFont typeface="Arial" pitchFamily="34" charset="0"/>
+              <a:buChar char="•"/>
+            </a:pPr>
+            <a:r>
+              <a:rPr lang="it-IT" dirty="0" smtClean="0"/>
+              <a:t>L</a:t>
+            </a:r>
+            <a:r>
+              <a:rPr lang="it-IT" dirty="0" smtClean="0"/>
+              <a:t>a selezione automatica della domanda successive in modo non deterministico.</a:t>
+            </a:r>
+          </a:p>
+          <a:p>
+            <a:pPr>
+              <a:buFont typeface="Arial" pitchFamily="34" charset="0"/>
+              <a:buChar char="•"/>
+            </a:pPr>
+            <a:r>
+              <a:rPr lang="it-IT" dirty="0" smtClean="0"/>
+              <a:t>La memorizzazione delle risposte che possono essere fornite come suggerimenti futuri.</a:t>
+            </a:r>
+          </a:p>
+          <a:p>
+            <a:pPr>
+              <a:buFont typeface="Arial" pitchFamily="34" charset="0"/>
+              <a:buChar char="•"/>
+            </a:pPr>
+            <a:r>
+              <a:rPr lang="it-IT" dirty="0" smtClean="0"/>
+              <a:t>La computazione di regole di un qualsiasi programma </a:t>
+            </a:r>
+            <a:r>
+              <a:rPr lang="it-IT" dirty="0" err="1" smtClean="0"/>
+              <a:t>prolog</a:t>
+            </a:r>
+            <a:r>
+              <a:rPr lang="it-IT" dirty="0" smtClean="0"/>
+              <a:t> alla risposta di una domanda, il che consente un utilizzo nei più disparati campi di questo progetto.</a:t>
+            </a:r>
+          </a:p>
+          <a:p>
+            <a:endParaRPr lang="it-IT" dirty="0" smtClean="0"/>
+          </a:p>
+          <a:p>
+            <a:r>
+              <a:rPr lang="it-IT" dirty="0" smtClean="0"/>
+              <a:t>	</a:t>
+            </a:r>
+            <a:endParaRPr lang="it-IT" dirty="0"/>
+          </a:p>
+        </p:txBody>
+      </p:sp>
+    </p:spTree>
+  </p:cSld>
+  <p:clrMapOvr>
+    <a:masterClrMapping/>
+  </p:clrMapOvr>
+  <p:timing>
+    <p:tnLst>
+      <p:par>
+        <p:cTn id="1" dur="indefinite" restart="never" nodeType="tmRoot"/>
+      </p:par>
+    </p:tnLst>
+  </p:timing>
+</p:sld>
+</file>
+
+<file path=ppt/slides/slide8.xml><?xml version="1.0" encoding="utf-8"?>
+<p:sld xmlns:a="http://schemas.openxmlformats.org/drawingml/2006/main" xmlns:r="http://schemas.openxmlformats.org/officeDocument/2006/relationships" xmlns:p="http://schemas.openxmlformats.org/presentationml/2006/main">
+  <p:cSld>
+    <p:spTree>
+      <p:nvGrpSpPr>
+        <p:cNvPr id="1" name=""/>
+        <p:cNvGrpSpPr/>
+        <p:nvPr/>
+      </p:nvGrpSpPr>
+      <p:grpSpPr>
+        <a:xfrm>
+          <a:off x="0" y="0"/>
+          <a:ext cx="0" cy="0"/>
+          <a:chOff x="0" y="0"/>
+          <a:chExt cx="0" cy="0"/>
+        </a:xfrm>
+      </p:grpSpPr>
+      <p:sp>
+        <p:nvSpPr>
+          <p:cNvPr id="2" name="Title 1"/>
+          <p:cNvSpPr>
+            <a:spLocks noGrp="1"/>
+          </p:cNvSpPr>
+          <p:nvPr>
+            <p:ph type="title"/>
+          </p:nvPr>
+        </p:nvSpPr>
+        <p:spPr/>
+        <p:txBody>
+          <a:bodyPr/>
+          <a:lstStyle/>
+          <a:p>
+            <a:r>
+              <a:rPr lang="it-IT" dirty="0" smtClean="0"/>
+              <a:t>Repository di rifrimento:</a:t>
+            </a:r>
+            <a:endParaRPr lang="it-IT" dirty="0"/>
+          </a:p>
+        </p:txBody>
+      </p:sp>
+      <p:sp>
+        <p:nvSpPr>
+          <p:cNvPr id="3" name="Content Placeholder 2"/>
+          <p:cNvSpPr>
+            <a:spLocks noGrp="1"/>
+          </p:cNvSpPr>
+          <p:nvPr>
+            <p:ph idx="1"/>
+          </p:nvPr>
+        </p:nvSpPr>
+        <p:spPr/>
+        <p:txBody>
+          <a:bodyPr/>
+          <a:lstStyle/>
+          <a:p>
+            <a:r>
+              <a:rPr lang="it-IT" sz="2400" dirty="0" smtClean="0"/>
+              <a:t>Progetto</a:t>
+            </a:r>
+          </a:p>
+          <a:p>
+            <a:pPr lvl="1"/>
+            <a:r>
+              <a:rPr lang="it-IT" sz="2000" dirty="0" smtClean="0"/>
+              <a:t>https://github.com/FerrariAndrea/CompilationHelper.git</a:t>
+            </a:r>
+          </a:p>
+          <a:p>
+            <a:r>
+              <a:rPr lang="it-IT" sz="2400" dirty="0" smtClean="0"/>
+              <a:t>Interfaccia prolog-node</a:t>
+            </a:r>
+          </a:p>
+          <a:p>
+            <a:pPr lvl="1"/>
+            <a:r>
+              <a:rPr lang="it-IT" sz="2000" dirty="0" smtClean="0"/>
+              <a:t>https://github.com/rla/node-swipl.git</a:t>
+            </a:r>
+          </a:p>
+          <a:p>
+            <a:r>
+              <a:rPr lang="it-IT" sz="2400" dirty="0" smtClean="0"/>
+              <a:t>Generatore di grafici in javascript</a:t>
+            </a:r>
+          </a:p>
+          <a:p>
+            <a:pPr lvl="1"/>
+            <a:r>
+              <a:rPr lang="it-IT" sz="2000" dirty="0" smtClean="0"/>
+              <a:t>https://github.com/jacomyal/sigma.js.git</a:t>
+            </a:r>
+          </a:p>
+        </p:txBody>
+      </p:sp>
+    </p:spTree>
+  </p:cSld>
+  <p:clrMapOvr>
+    <a:masterClrMapping/>
+  </p:clrMapOvr>
+  <p:timing>
+    <p:tnLst>
+      <p:par>
+        <p:cTn id="1" dur="indefinite" restart="never" nodeType="tmRoot"/>
+      </p:par>
+    </p:tnLst>
+  </p:timing>
 </p:sld>
 </file>
 

</xml_diff>